<commit_message>
Search Bar & Initial Cart Implementation
-created cart_controller
-added cart show route
-generated add_cart migration
-ran migration
-created cart schema
-implemented search bar function in products/index.html
-configured routes
-created add to cart button/route on products/show.html
</commit_message>
<xml_diff>
--- a/design/mockups.pptx
+++ b/design/mockups.pptx
@@ -719,6 +719,93 @@
     <p:extLst>
       <p:ext uri="{BB962C8B-B14F-4D97-AF65-F5344CB8AC3E}">
         <p14:creationId xmlns:p14="http://schemas.microsoft.com/office/powerpoint/2010/main" val="3236123164"/>
+      </p:ext>
+    </p:extLst>
+  </p:cSld>
+  <p:clrMapOvr>
+    <a:masterClrMapping/>
+  </p:clrMapOvr>
+</p:notes>
+</file>
+
+<file path=ppt/notesSlides/notesSlide4.xml><?xml version="1.0" encoding="utf-8"?>
+<p:notes xmlns:a="http://schemas.openxmlformats.org/drawingml/2006/main" xmlns:r="http://schemas.openxmlformats.org/officeDocument/2006/relationships" xmlns:p="http://schemas.openxmlformats.org/presentationml/2006/main">
+  <p:cSld>
+    <p:spTree>
+      <p:nvGrpSpPr>
+        <p:cNvPr id="1" name=""/>
+        <p:cNvGrpSpPr/>
+        <p:nvPr/>
+      </p:nvGrpSpPr>
+      <p:grpSpPr>
+        <a:xfrm>
+          <a:off x="0" y="0"/>
+          <a:ext cx="0" cy="0"/>
+          <a:chOff x="0" y="0"/>
+          <a:chExt cx="0" cy="0"/>
+        </a:xfrm>
+      </p:grpSpPr>
+      <p:sp>
+        <p:nvSpPr>
+          <p:cNvPr id="2" name="Slide Image Placeholder 1"/>
+          <p:cNvSpPr>
+            <a:spLocks noGrp="1" noRot="1" noChangeAspect="1"/>
+          </p:cNvSpPr>
+          <p:nvPr>
+            <p:ph type="sldImg"/>
+          </p:nvPr>
+        </p:nvSpPr>
+        <p:spPr/>
+      </p:sp>
+      <p:sp>
+        <p:nvSpPr>
+          <p:cNvPr id="3" name="Notes Placeholder 2"/>
+          <p:cNvSpPr>
+            <a:spLocks noGrp="1"/>
+          </p:cNvSpPr>
+          <p:nvPr>
+            <p:ph type="body" idx="1"/>
+          </p:nvPr>
+        </p:nvSpPr>
+        <p:spPr/>
+        <p:txBody>
+          <a:bodyPr/>
+          <a:lstStyle/>
+          <a:p>
+            <a:r>
+              <a:rPr lang="en-US" dirty="0"/>
+              <a:t>Database Structure</a:t>
+            </a:r>
+          </a:p>
+        </p:txBody>
+      </p:sp>
+      <p:sp>
+        <p:nvSpPr>
+          <p:cNvPr id="4" name="Slide Number Placeholder 3"/>
+          <p:cNvSpPr>
+            <a:spLocks noGrp="1"/>
+          </p:cNvSpPr>
+          <p:nvPr>
+            <p:ph type="sldNum" sz="quarter" idx="5"/>
+          </p:nvPr>
+        </p:nvSpPr>
+        <p:spPr/>
+        <p:txBody>
+          <a:bodyPr/>
+          <a:lstStyle/>
+          <a:p>
+            <a:fld id="{B43C8CF7-923B-534E-BF53-23230B27D7C1}" type="slidenum">
+              <a:rPr lang="en-US" smtClean="0"/>
+              <a:t>4</a:t>
+            </a:fld>
+            <a:endParaRPr lang="en-US"/>
+          </a:p>
+        </p:txBody>
+      </p:sp>
+    </p:spTree>
+    <p:extLst>
+      <p:ext uri="{BB962C8B-B14F-4D97-AF65-F5344CB8AC3E}">
+        <p14:creationId xmlns:p14="http://schemas.microsoft.com/office/powerpoint/2010/main" val="4258977486"/>
       </p:ext>
     </p:extLst>
   </p:cSld>
@@ -5494,6 +5581,41 @@
           </a:prstGeom>
         </p:spPr>
       </p:pic>
+      <p:sp>
+        <p:nvSpPr>
+          <p:cNvPr id="24" name="TextBox 23">
+            <a:extLst>
+              <a:ext uri="{FF2B5EF4-FFF2-40B4-BE49-F238E27FC236}">
+                <a16:creationId xmlns:a16="http://schemas.microsoft.com/office/drawing/2014/main" id="{DA25CA6F-25E5-924F-8779-C15AF95F3D90}"/>
+              </a:ext>
+            </a:extLst>
+          </p:cNvPr>
+          <p:cNvSpPr txBox="1"/>
+          <p:nvPr/>
+        </p:nvSpPr>
+        <p:spPr>
+          <a:xfrm>
+            <a:off x="9102427" y="1514601"/>
+            <a:ext cx="1145826" cy="369332"/>
+          </a:xfrm>
+          <a:prstGeom prst="rect">
+            <a:avLst/>
+          </a:prstGeom>
+          <a:noFill/>
+        </p:spPr>
+        <p:txBody>
+          <a:bodyPr wrap="none" rtlCol="0">
+            <a:spAutoFit/>
+          </a:bodyPr>
+          <a:lstStyle/>
+          <a:p>
+            <a:r>
+              <a:rPr lang="en-US" dirty="0"/>
+              <a:t>Go to Cart</a:t>
+            </a:r>
+          </a:p>
+        </p:txBody>
+      </p:sp>
     </p:spTree>
     <p:extLst>
       <p:ext uri="{BB962C8B-B14F-4D97-AF65-F5344CB8AC3E}">
@@ -7825,25 +7947,6 @@
                   <a:schemeClr val="tx1"/>
                 </a:solidFill>
               </a:rPr>
-              <a:t>user_id</a:t>
-            </a:r>
-            <a:endParaRPr lang="en-US" dirty="0">
-              <a:solidFill>
-                <a:schemeClr val="tx1"/>
-              </a:solidFill>
-            </a:endParaRPr>
-          </a:p>
-          <a:p>
-            <a:pPr marL="285750" indent="-285750">
-              <a:buFont typeface="Arial" panose="020B0604020202020204" pitchFamily="34" charset="0"/>
-              <a:buChar char="•"/>
-            </a:pPr>
-            <a:r>
-              <a:rPr lang="en-US" dirty="0" err="1">
-                <a:solidFill>
-                  <a:schemeClr val="tx1"/>
-                </a:solidFill>
-              </a:rPr>
               <a:t>product_list</a:t>
             </a:r>
             <a:endParaRPr lang="en-US" dirty="0">
@@ -7865,6 +7968,39 @@
               </a:rPr>
               <a:t>products</a:t>
             </a:r>
+          </a:p>
+          <a:p>
+            <a:pPr marL="1200150" lvl="2" indent="-285750">
+              <a:buFont typeface="Arial" panose="020B0604020202020204" pitchFamily="34" charset="0"/>
+              <a:buChar char="•"/>
+            </a:pPr>
+            <a:r>
+              <a:rPr lang="en-US" dirty="0">
+                <a:solidFill>
+                  <a:schemeClr val="tx1"/>
+                </a:solidFill>
+              </a:rPr>
+              <a:t>id</a:t>
+            </a:r>
+          </a:p>
+          <a:p>
+            <a:pPr marL="1200150" lvl="2" indent="-285750">
+              <a:buFont typeface="Arial" panose="020B0604020202020204" pitchFamily="34" charset="0"/>
+              <a:buChar char="•"/>
+            </a:pPr>
+            <a:r>
+              <a:rPr lang="en-US">
+                <a:solidFill>
+                  <a:schemeClr val="tx1"/>
+                </a:solidFill>
+              </a:rPr>
+              <a:t>name</a:t>
+            </a:r>
+            <a:endParaRPr lang="en-US" dirty="0">
+              <a:solidFill>
+                <a:schemeClr val="tx1"/>
+              </a:solidFill>
+            </a:endParaRPr>
           </a:p>
           <a:p>
             <a:pPr marL="285750" indent="-285750">

</xml_diff>